<commit_message>
Update plot.py with bugfix and handling different fitting scenarios
</commit_message>
<xml_diff>
--- a/Y1_Kinetics/Kinetics with Python.pptx
+++ b/Y1_Kinetics/Kinetics with Python.pptx
@@ -12222,7 +12222,11 @@
             </a:pPr>
             <a:r>
               <a:rPr i="1" lang="en-GB"/>
-              <a:t>suffix = '_output’</a:t>
+              <a:t># </a:t>
+            </a:r>
+            <a:r>
+              <a:rPr i="1" lang="en-GB"/>
+              <a:t>suffix = '_suffix’</a:t>
             </a:r>
             <a:endParaRPr/>
           </a:p>
@@ -13959,7 +13963,7 @@
             </a:pPr>
             <a:r>
               <a:rPr i="1" lang="en-GB"/>
-              <a:t>def func(x,m,c):</a:t>
+              <a:t>def linear(x,m,c):</a:t>
             </a:r>
             <a:endParaRPr/>
           </a:p>
@@ -14387,7 +14391,7 @@
             </a:pPr>
             <a:r>
               <a:rPr i="1" lang="en-GB"/>
-              <a:t>output_fname = 'fit_data'</a:t>
+              <a:t>output_fname = 'fit_parameters'</a:t>
             </a:r>
             <a:endParaRPr/>
           </a:p>
@@ -15733,7 +15737,7 @@
             </a:pPr>
             <a:r>
               <a:rPr lang="en-GB"/>
-              <a:t>To make a plot using the data in our ‘fit_data’ file, we need to add the temperatures.</a:t>
+              <a:t>To make a plot using the data in our ‘fit_parameters’ file, we need to add the temperatures.</a:t>
             </a:r>
             <a:endParaRPr/>
           </a:p>
@@ -15987,7 +15991,7 @@
             </a:pPr>
             <a:r>
               <a:rPr lang="en-GB"/>
-              <a:t>Python or Excel</a:t>
+              <a:t>Arrhenius plot</a:t>
             </a:r>
             <a:endParaRPr/>
           </a:p>
@@ -16096,7 +16100,7 @@
             </a:pPr>
             <a:r>
               <a:rPr lang="en-GB"/>
-              <a:t>Load the data in the ‘fit_data’ file, modify the data manipulation section to make sure you plot the right variables, add the line of best fit.</a:t>
+              <a:t>Load the data in the ‘fit_parameters’ file, modify the data manipulation section to make sure you plot the right variables, add the line of best fit.</a:t>
             </a:r>
             <a:endParaRPr/>
           </a:p>
@@ -17454,7 +17458,7 @@
             </a:pPr>
             <a:r>
               <a:rPr lang="en-GB"/>
-              <a:t>The first column in `fit_data` contains T in °C</a:t>
+              <a:t>The first column in ‘fit_parameters’ contains T in °C</a:t>
             </a:r>
             <a:endParaRPr/>
           </a:p>
@@ -17475,7 +17479,19 @@
             </a:pPr>
             <a:r>
               <a:rPr lang="en-GB"/>
-              <a:t>The second column in `fit_data` contains -</a:t>
+              <a:t>The second column in </a:t>
+            </a:r>
+            <a:r>
+              <a:rPr lang="en-GB">
+                <a:solidFill>
+                  <a:schemeClr val="dk1"/>
+                </a:solidFill>
+              </a:rPr>
+              <a:t>‘fit_parameters’</a:t>
+            </a:r>
+            <a:r>
+              <a:rPr lang="en-GB"/>
+              <a:t> contains -</a:t>
             </a:r>
             <a:r>
               <a:rPr i="1" lang="en-GB"/>

</xml_diff>